<commit_message>
neue Folienversion mit Titel
</commit_message>
<xml_diff>
--- a/presentation/AOTF.pptx
+++ b/presentation/AOTF.pptx
@@ -856,7 +856,7 @@
             <a:fld id="{B61BEF0D-F0BB-DE4B-95CE-6DB70DBA9567}" type="datetimeFigureOut">
               <a:rPr lang="en-US" dirty="0"/>
               <a:pPr/>
-              <a:t>12/8/2014</a:t>
+              <a:t>12/9/2014</a:t>
             </a:fld>
             <a:endParaRPr lang="en-US" dirty="0"/>
           </a:p>
@@ -1104,7 +1104,7 @@
             <a:fld id="{B61BEF0D-F0BB-DE4B-95CE-6DB70DBA9567}" type="datetimeFigureOut">
               <a:rPr lang="en-US" dirty="0"/>
               <a:pPr/>
-              <a:t>12/8/2014</a:t>
+              <a:t>12/9/2014</a:t>
             </a:fld>
             <a:endParaRPr lang="en-US" dirty="0"/>
           </a:p>
@@ -1415,7 +1415,7 @@
             <a:fld id="{B61BEF0D-F0BB-DE4B-95CE-6DB70DBA9567}" type="datetimeFigureOut">
               <a:rPr lang="en-US" dirty="0"/>
               <a:pPr/>
-              <a:t>12/8/2014</a:t>
+              <a:t>12/9/2014</a:t>
             </a:fld>
             <a:endParaRPr lang="en-US" dirty="0"/>
           </a:p>
@@ -1753,7 +1753,7 @@
             <a:fld id="{B61BEF0D-F0BB-DE4B-95CE-6DB70DBA9567}" type="datetimeFigureOut">
               <a:rPr lang="en-US" dirty="0"/>
               <a:pPr/>
-              <a:t>12/8/2014</a:t>
+              <a:t>12/9/2014</a:t>
             </a:fld>
             <a:endParaRPr lang="en-US" dirty="0"/>
           </a:p>
@@ -2064,7 +2064,7 @@
             <a:fld id="{B61BEF0D-F0BB-DE4B-95CE-6DB70DBA9567}" type="datetimeFigureOut">
               <a:rPr lang="en-US" dirty="0"/>
               <a:pPr/>
-              <a:t>12/8/2014</a:t>
+              <a:t>12/9/2014</a:t>
             </a:fld>
             <a:endParaRPr lang="en-US" dirty="0"/>
           </a:p>
@@ -2454,7 +2454,7 @@
             <a:fld id="{B61BEF0D-F0BB-DE4B-95CE-6DB70DBA9567}" type="datetimeFigureOut">
               <a:rPr lang="en-US" dirty="0"/>
               <a:pPr/>
-              <a:t>12/8/2014</a:t>
+              <a:t>12/9/2014</a:t>
             </a:fld>
             <a:endParaRPr lang="en-US" dirty="0"/>
           </a:p>
@@ -2620,7 +2620,7 @@
           <a:p>
             <a:fld id="{55C6B4A9-1611-4792-9094-5F34BCA07E0B}" type="datetimeFigureOut">
               <a:rPr lang="en-US" dirty="0"/>
-              <a:t>12/8/2014</a:t>
+              <a:t>12/9/2014</a:t>
             </a:fld>
             <a:endParaRPr lang="en-US" dirty="0"/>
           </a:p>
@@ -2796,7 +2796,7 @@
             <a:fld id="{B61BEF0D-F0BB-DE4B-95CE-6DB70DBA9567}" type="datetimeFigureOut">
               <a:rPr lang="en-US" dirty="0"/>
               <a:pPr/>
-              <a:t>12/8/2014</a:t>
+              <a:t>12/9/2014</a:t>
             </a:fld>
             <a:endParaRPr lang="en-US" dirty="0"/>
           </a:p>
@@ -2969,7 +2969,7 @@
             <a:fld id="{B61BEF0D-F0BB-DE4B-95CE-6DB70DBA9567}" type="datetimeFigureOut">
               <a:rPr lang="en-US" dirty="0"/>
               <a:pPr/>
-              <a:t>12/8/2014</a:t>
+              <a:t>12/9/2014</a:t>
             </a:fld>
             <a:endParaRPr lang="en-US" dirty="0"/>
           </a:p>
@@ -3213,7 +3213,7 @@
             <a:fld id="{B61BEF0D-F0BB-DE4B-95CE-6DB70DBA9567}" type="datetimeFigureOut">
               <a:rPr lang="en-US" dirty="0"/>
               <a:pPr/>
-              <a:t>12/8/2014</a:t>
+              <a:t>12/9/2014</a:t>
             </a:fld>
             <a:endParaRPr lang="en-US" dirty="0"/>
           </a:p>
@@ -3441,7 +3441,7 @@
           <a:p>
             <a:fld id="{EB712588-04B1-427B-82EE-E8DB90309F08}" type="datetimeFigureOut">
               <a:rPr lang="en-US" dirty="0"/>
-              <a:t>12/8/2014</a:t>
+              <a:t>12/9/2014</a:t>
             </a:fld>
             <a:endParaRPr lang="en-US" dirty="0"/>
           </a:p>
@@ -3811,7 +3811,7 @@
             <a:fld id="{B61BEF0D-F0BB-DE4B-95CE-6DB70DBA9567}" type="datetimeFigureOut">
               <a:rPr lang="en-US" dirty="0"/>
               <a:pPr/>
-              <a:t>12/8/2014</a:t>
+              <a:t>12/9/2014</a:t>
             </a:fld>
             <a:endParaRPr lang="en-US" dirty="0"/>
           </a:p>
@@ -3931,7 +3931,7 @@
             <a:fld id="{B61BEF0D-F0BB-DE4B-95CE-6DB70DBA9567}" type="datetimeFigureOut">
               <a:rPr lang="en-US" dirty="0"/>
               <a:pPr/>
-              <a:t>12/8/2014</a:t>
+              <a:t>12/9/2014</a:t>
             </a:fld>
             <a:endParaRPr lang="en-US" dirty="0"/>
           </a:p>
@@ -4023,7 +4023,7 @@
             <a:fld id="{B61BEF0D-F0BB-DE4B-95CE-6DB70DBA9567}" type="datetimeFigureOut">
               <a:rPr lang="en-US" dirty="0"/>
               <a:pPr/>
-              <a:t>12/8/2014</a:t>
+              <a:t>12/9/2014</a:t>
             </a:fld>
             <a:endParaRPr lang="en-US" dirty="0"/>
           </a:p>
@@ -4274,7 +4274,7 @@
           <a:p>
             <a:fld id="{42A54C80-263E-416B-A8E0-580EDEADCBDC}" type="datetimeFigureOut">
               <a:rPr lang="en-US" dirty="0"/>
-              <a:t>12/8/2014</a:t>
+              <a:t>12/9/2014</a:t>
             </a:fld>
             <a:endParaRPr lang="en-US" dirty="0"/>
           </a:p>
@@ -4533,7 +4533,7 @@
             <a:fld id="{B61BEF0D-F0BB-DE4B-95CE-6DB70DBA9567}" type="datetimeFigureOut">
               <a:rPr lang="en-US" dirty="0"/>
               <a:pPr/>
-              <a:t>12/8/2014</a:t>
+              <a:t>12/9/2014</a:t>
             </a:fld>
             <a:endParaRPr lang="en-US" dirty="0"/>
           </a:p>
@@ -5273,7 +5273,7 @@
             <a:fld id="{B61BEF0D-F0BB-DE4B-95CE-6DB70DBA9567}" type="datetimeFigureOut">
               <a:rPr lang="en-US" dirty="0"/>
               <a:pPr/>
-              <a:t>12/8/2014</a:t>
+              <a:t>12/9/2014</a:t>
             </a:fld>
             <a:endParaRPr lang="en-US" dirty="0"/>
           </a:p>
@@ -5809,10 +5809,14 @@
           <a:lstStyle/>
           <a:p>
             <a:r>
-              <a:rPr lang="de-DE" dirty="0" smtClean="0"/>
+              <a:rPr lang="de-DE" dirty="0" smtClean="0">
+                <a:latin typeface="VolkswagenHeadline" panose="00000400000000000000" pitchFamily="2" charset="0"/>
+              </a:rPr>
               <a:t>Gruppe02</a:t>
             </a:r>
-            <a:endParaRPr lang="de-DE" dirty="0"/>
+            <a:endParaRPr lang="de-DE" dirty="0">
+              <a:latin typeface="VolkswagenHeadline" panose="00000400000000000000" pitchFamily="2" charset="0"/>
+            </a:endParaRPr>
           </a:p>
         </p:txBody>
       </p:sp>
@@ -5831,7 +5835,27 @@
           <a:bodyPr/>
           <a:lstStyle/>
           <a:p>
-            <a:endParaRPr lang="de-DE"/>
+            <a:r>
+              <a:rPr lang="de-DE" dirty="0">
+                <a:latin typeface="VolkswagenCopy" panose="00000400000000000000" pitchFamily="2" charset="0"/>
+              </a:rPr>
+              <a:t>Effiziente </a:t>
+            </a:r>
+            <a:r>
+              <a:rPr lang="de-DE" dirty="0" smtClean="0">
+                <a:latin typeface="VolkswagenCopy" panose="00000400000000000000" pitchFamily="2" charset="0"/>
+              </a:rPr>
+              <a:t>Ressourcenverteilung </a:t>
+            </a:r>
+            <a:r>
+              <a:rPr lang="de-DE" dirty="0">
+                <a:latin typeface="VolkswagenCopy" panose="00000400000000000000" pitchFamily="2" charset="0"/>
+              </a:rPr>
+              <a:t>bei mangelndem Angebot und unvollständiger Information.</a:t>
+            </a:r>
+            <a:endParaRPr lang="de-DE" dirty="0">
+              <a:latin typeface="VolkswagenCopy" panose="00000400000000000000" pitchFamily="2" charset="0"/>
+            </a:endParaRPr>
           </a:p>
         </p:txBody>
       </p:sp>
@@ -6068,19 +6092,7 @@
               <a:rPr lang="de-DE" dirty="0" smtClean="0">
                 <a:latin typeface="VolkswagenCopy" panose="00000400000000000000" pitchFamily="2" charset="0"/>
               </a:rPr>
-              <a:t>E</a:t>
-            </a:r>
-            <a:r>
-              <a:rPr lang="de-DE" dirty="0" smtClean="0">
-                <a:latin typeface="VolkswagenCopy" panose="00000400000000000000" pitchFamily="2" charset="0"/>
-              </a:rPr>
-              <a:t>galitäre </a:t>
-            </a:r>
-            <a:r>
-              <a:rPr lang="de-DE" dirty="0" smtClean="0">
-                <a:latin typeface="VolkswagenCopy" panose="00000400000000000000" pitchFamily="2" charset="0"/>
-              </a:rPr>
-              <a:t>soziale Wohlfahrt</a:t>
+              <a:t>Egalitäre soziale Wohlfahrt</a:t>
             </a:r>
           </a:p>
           <a:p>
@@ -7870,12 +7882,12 @@
           <a:p>
             <a:r>
               <a:rPr lang="de-DE" dirty="0" smtClean="0">
-                <a:latin typeface="VolkswagenCopy" panose="00000400000000000000" pitchFamily="2" charset="0"/>
+                <a:latin typeface="VolkswagenHeadline" panose="00000400000000000000" pitchFamily="2" charset="0"/>
               </a:rPr>
               <a:t>Ein Unterangebot sorgt für interessantere Koalitionsbildungen</a:t>
             </a:r>
             <a:endParaRPr lang="de-DE" dirty="0">
-              <a:latin typeface="VolkswagenCopy" panose="00000400000000000000" pitchFamily="2" charset="0"/>
+              <a:latin typeface="VolkswagenHeadline" panose="00000400000000000000" pitchFamily="2" charset="0"/>
             </a:endParaRPr>
           </a:p>
         </p:txBody>
@@ -7932,17 +7944,8 @@
               <a:rPr lang="de-DE" dirty="0" smtClean="0">
                 <a:latin typeface="VolkswagenCopy" panose="00000400000000000000" pitchFamily="2" charset="0"/>
               </a:rPr>
-              <a:t>enige </a:t>
-            </a:r>
-            <a:r>
-              <a:rPr lang="de-DE" dirty="0" smtClean="0">
-                <a:latin typeface="VolkswagenCopy" panose="00000400000000000000" pitchFamily="2" charset="0"/>
-              </a:rPr>
-              <a:t>große</a:t>
-            </a:r>
-            <a:endParaRPr lang="de-DE" dirty="0" smtClean="0">
-              <a:latin typeface="VolkswagenCopy" panose="00000400000000000000" pitchFamily="2" charset="0"/>
-            </a:endParaRPr>
+              <a:t>enige große</a:t>
+            </a:r>
           </a:p>
           <a:p>
             <a:pPr>
@@ -7959,19 +7962,7 @@
               <a:rPr lang="de-DE" dirty="0" smtClean="0">
                 <a:latin typeface="VolkswagenCopy" panose="00000400000000000000" pitchFamily="2" charset="0"/>
               </a:rPr>
-              <a:t>in </a:t>
-            </a:r>
-            <a:r>
-              <a:rPr lang="de-DE" dirty="0" smtClean="0">
-                <a:latin typeface="VolkswagenCopy" panose="00000400000000000000" pitchFamily="2" charset="0"/>
-              </a:rPr>
-              <a:t>epischer </a:t>
-            </a:r>
-            <a:r>
-              <a:rPr lang="de-DE" dirty="0" smtClean="0">
-                <a:latin typeface="VolkswagenCopy" panose="00000400000000000000" pitchFamily="2" charset="0"/>
-              </a:rPr>
-              <a:t>Auftrag</a:t>
+              <a:t>in epischer Auftrag</a:t>
             </a:r>
           </a:p>
           <a:p>

</xml_diff>